<commit_message>
Added more features like security, logging, exception handling, hystrix etc.
</commit_message>
<xml_diff>
--- a/slides.pptx
+++ b/slides.pptx
@@ -9,11 +9,13 @@
     <p:sldId id="258" r:id="rId3"/>
     <p:sldId id="257" r:id="rId4"/>
     <p:sldId id="259" r:id="rId5"/>
-    <p:sldId id="261" r:id="rId6"/>
-    <p:sldId id="263" r:id="rId7"/>
-    <p:sldId id="260" r:id="rId8"/>
-    <p:sldId id="262" r:id="rId9"/>
-    <p:sldId id="264" r:id="rId10"/>
+    <p:sldId id="268" r:id="rId6"/>
+    <p:sldId id="269" r:id="rId7"/>
+    <p:sldId id="263" r:id="rId8"/>
+    <p:sldId id="260" r:id="rId9"/>
+    <p:sldId id="266" r:id="rId10"/>
+    <p:sldId id="267" r:id="rId11"/>
+    <p:sldId id="264" r:id="rId12"/>
   </p:sldIdLst>
   <p:sldSz cx="9144000" cy="6858000" type="screen4x3"/>
   <p:notesSz cx="6858000" cy="9144000"/>
@@ -926,7 +928,7 @@
             <a:fld id="{1D8BD707-D9CF-40AE-B4C6-C98DA3205C09}" type="datetimeFigureOut">
               <a:rPr lang="en-US" smtClean="0"/>
               <a:pPr/>
-              <a:t>3/3/2019</a:t>
+              <a:t>3/22/2019</a:t>
             </a:fld>
             <a:endParaRPr lang="en-US"/>
           </a:p>
@@ -1179,7 +1181,7 @@
             <a:fld id="{1D8BD707-D9CF-40AE-B4C6-C98DA3205C09}" type="datetimeFigureOut">
               <a:rPr lang="en-US" smtClean="0"/>
               <a:pPr/>
-              <a:t>3/3/2019</a:t>
+              <a:t>3/22/2019</a:t>
             </a:fld>
             <a:endParaRPr lang="en-US"/>
           </a:p>
@@ -1495,7 +1497,7 @@
             <a:fld id="{1D8BD707-D9CF-40AE-B4C6-C98DA3205C09}" type="datetimeFigureOut">
               <a:rPr lang="en-US" smtClean="0"/>
               <a:pPr/>
-              <a:t>3/3/2019</a:t>
+              <a:t>3/22/2019</a:t>
             </a:fld>
             <a:endParaRPr lang="en-US"/>
           </a:p>
@@ -1830,7 +1832,7 @@
             <a:fld id="{1D8BD707-D9CF-40AE-B4C6-C98DA3205C09}" type="datetimeFigureOut">
               <a:rPr lang="en-US" smtClean="0"/>
               <a:pPr/>
-              <a:t>3/3/2019</a:t>
+              <a:t>3/22/2019</a:t>
             </a:fld>
             <a:endParaRPr lang="en-US"/>
           </a:p>
@@ -2146,7 +2148,7 @@
             <a:fld id="{1D8BD707-D9CF-40AE-B4C6-C98DA3205C09}" type="datetimeFigureOut">
               <a:rPr lang="en-US" smtClean="0"/>
               <a:pPr/>
-              <a:t>3/3/2019</a:t>
+              <a:t>3/22/2019</a:t>
             </a:fld>
             <a:endParaRPr lang="en-US"/>
           </a:p>
@@ -2541,7 +2543,7 @@
             <a:fld id="{1D8BD707-D9CF-40AE-B4C6-C98DA3205C09}" type="datetimeFigureOut">
               <a:rPr lang="en-US" smtClean="0"/>
               <a:pPr/>
-              <a:t>3/3/2019</a:t>
+              <a:t>3/22/2019</a:t>
             </a:fld>
             <a:endParaRPr lang="en-US"/>
           </a:p>
@@ -2713,7 +2715,7 @@
             <a:fld id="{1D8BD707-D9CF-40AE-B4C6-C98DA3205C09}" type="datetimeFigureOut">
               <a:rPr lang="en-US" smtClean="0"/>
               <a:pPr/>
-              <a:t>3/3/2019</a:t>
+              <a:t>3/22/2019</a:t>
             </a:fld>
             <a:endParaRPr lang="en-US"/>
           </a:p>
@@ -2895,7 +2897,7 @@
             <a:fld id="{1D8BD707-D9CF-40AE-B4C6-C98DA3205C09}" type="datetimeFigureOut">
               <a:rPr lang="en-US" smtClean="0"/>
               <a:pPr/>
-              <a:t>3/3/2019</a:t>
+              <a:t>3/22/2019</a:t>
             </a:fld>
             <a:endParaRPr lang="en-US"/>
           </a:p>
@@ -3067,7 +3069,7 @@
             <a:fld id="{1D8BD707-D9CF-40AE-B4C6-C98DA3205C09}" type="datetimeFigureOut">
               <a:rPr lang="en-US" smtClean="0"/>
               <a:pPr/>
-              <a:t>3/3/2019</a:t>
+              <a:t>3/22/2019</a:t>
             </a:fld>
             <a:endParaRPr lang="en-US"/>
           </a:p>
@@ -3316,7 +3318,7 @@
             <a:fld id="{1D8BD707-D9CF-40AE-B4C6-C98DA3205C09}" type="datetimeFigureOut">
               <a:rPr lang="en-US" smtClean="0"/>
               <a:pPr/>
-              <a:t>3/3/2019</a:t>
+              <a:t>3/22/2019</a:t>
             </a:fld>
             <a:endParaRPr lang="en-US"/>
           </a:p>
@@ -3615,7 +3617,7 @@
             <a:fld id="{1D8BD707-D9CF-40AE-B4C6-C98DA3205C09}" type="datetimeFigureOut">
               <a:rPr lang="en-US" smtClean="0"/>
               <a:pPr/>
-              <a:t>3/3/2019</a:t>
+              <a:t>3/22/2019</a:t>
             </a:fld>
             <a:endParaRPr lang="en-US"/>
           </a:p>
@@ -3996,7 +3998,7 @@
             <a:fld id="{1D8BD707-D9CF-40AE-B4C6-C98DA3205C09}" type="datetimeFigureOut">
               <a:rPr lang="en-US" smtClean="0"/>
               <a:pPr/>
-              <a:t>3/3/2019</a:t>
+              <a:t>3/22/2019</a:t>
             </a:fld>
             <a:endParaRPr lang="en-US"/>
           </a:p>
@@ -4121,7 +4123,7 @@
             <a:fld id="{1D8BD707-D9CF-40AE-B4C6-C98DA3205C09}" type="datetimeFigureOut">
               <a:rPr lang="en-US" smtClean="0"/>
               <a:pPr/>
-              <a:t>3/3/2019</a:t>
+              <a:t>3/22/2019</a:t>
             </a:fld>
             <a:endParaRPr lang="en-US"/>
           </a:p>
@@ -4218,7 +4220,7 @@
             <a:fld id="{1D8BD707-D9CF-40AE-B4C6-C98DA3205C09}" type="datetimeFigureOut">
               <a:rPr lang="en-US" smtClean="0"/>
               <a:pPr/>
-              <a:t>3/3/2019</a:t>
+              <a:t>3/22/2019</a:t>
             </a:fld>
             <a:endParaRPr lang="en-US"/>
           </a:p>
@@ -4475,7 +4477,7 @@
             <a:fld id="{1D8BD707-D9CF-40AE-B4C6-C98DA3205C09}" type="datetimeFigureOut">
               <a:rPr lang="en-US" smtClean="0"/>
               <a:pPr/>
-              <a:t>3/3/2019</a:t>
+              <a:t>3/22/2019</a:t>
             </a:fld>
             <a:endParaRPr lang="en-US"/>
           </a:p>
@@ -4740,7 +4742,7 @@
             <a:fld id="{1D8BD707-D9CF-40AE-B4C6-C98DA3205C09}" type="datetimeFigureOut">
               <a:rPr lang="en-US" smtClean="0"/>
               <a:pPr/>
-              <a:t>3/3/2019</a:t>
+              <a:t>3/22/2019</a:t>
             </a:fld>
             <a:endParaRPr lang="en-US"/>
           </a:p>
@@ -5556,7 +5558,7 @@
             <a:fld id="{1D8BD707-D9CF-40AE-B4C6-C98DA3205C09}" type="datetimeFigureOut">
               <a:rPr lang="en-US" smtClean="0"/>
               <a:pPr/>
-              <a:t>3/3/2019</a:t>
+              <a:t>3/22/2019</a:t>
             </a:fld>
             <a:endParaRPr lang="en-US"/>
           </a:p>
@@ -6150,6 +6152,201 @@
 </p:sld>
 </file>
 
+<file path=ppt/slides/slide10.xml><?xml version="1.0" encoding="utf-8"?>
+<p:sld xmlns:a="http://schemas.openxmlformats.org/drawingml/2006/main" xmlns:r="http://schemas.openxmlformats.org/officeDocument/2006/relationships" xmlns:p="http://schemas.openxmlformats.org/presentationml/2006/main">
+  <p:cSld>
+    <p:spTree>
+      <p:nvGrpSpPr>
+        <p:cNvPr id="1" name=""/>
+        <p:cNvGrpSpPr/>
+        <p:nvPr/>
+      </p:nvGrpSpPr>
+      <p:grpSpPr>
+        <a:xfrm>
+          <a:off x="0" y="0"/>
+          <a:ext cx="0" cy="0"/>
+          <a:chOff x="0" y="0"/>
+          <a:chExt cx="0" cy="0"/>
+        </a:xfrm>
+      </p:grpSpPr>
+      <p:sp>
+        <p:nvSpPr>
+          <p:cNvPr id="2" name="Title 1">
+            <a:extLst>
+              <a:ext uri="{FF2B5EF4-FFF2-40B4-BE49-F238E27FC236}">
+                <a16:creationId xmlns:a16="http://schemas.microsoft.com/office/drawing/2014/main" id="{96CBC143-198D-4DE8-9EB7-CBCBB60EFD0E}"/>
+              </a:ext>
+            </a:extLst>
+          </p:cNvPr>
+          <p:cNvSpPr>
+            <a:spLocks noGrp="1"/>
+          </p:cNvSpPr>
+          <p:nvPr>
+            <p:ph type="title"/>
+          </p:nvPr>
+        </p:nvSpPr>
+        <p:spPr/>
+        <p:txBody>
+          <a:bodyPr>
+            <a:normAutofit/>
+          </a:bodyPr>
+          <a:lstStyle/>
+          <a:p>
+            <a:r>
+              <a:rPr lang="en-US" sz="2800" dirty="0"/>
+              <a:t>Test Case: Tested/</a:t>
+            </a:r>
+            <a:r>
+              <a:rPr lang="en-US" sz="2800" dirty="0" err="1"/>
+              <a:t>shortestConnection</a:t>
+            </a:r>
+            <a:endParaRPr lang="en-US" sz="2800" dirty="0"/>
+          </a:p>
+        </p:txBody>
+      </p:sp>
+      <p:pic>
+        <p:nvPicPr>
+          <p:cNvPr id="3" name="Picture 2">
+            <a:extLst>
+              <a:ext uri="{FF2B5EF4-FFF2-40B4-BE49-F238E27FC236}">
+                <a16:creationId xmlns:a16="http://schemas.microsoft.com/office/drawing/2014/main" id="{9E63696B-0680-4FCE-8EA1-EE3424512577}"/>
+              </a:ext>
+            </a:extLst>
+          </p:cNvPr>
+          <p:cNvPicPr>
+            <a:picLocks noChangeAspect="1"/>
+          </p:cNvPicPr>
+          <p:nvPr/>
+        </p:nvPicPr>
+        <p:blipFill>
+          <a:blip r:embed="rId2"/>
+          <a:stretch>
+            <a:fillRect/>
+          </a:stretch>
+        </p:blipFill>
+        <p:spPr>
+          <a:xfrm>
+            <a:off x="0" y="1676400"/>
+            <a:ext cx="8998462" cy="4492256"/>
+          </a:xfrm>
+          <a:prstGeom prst="rect">
+            <a:avLst/>
+          </a:prstGeom>
+        </p:spPr>
+      </p:pic>
+    </p:spTree>
+    <p:extLst>
+      <p:ext uri="{BB962C8B-B14F-4D97-AF65-F5344CB8AC3E}">
+        <p14:creationId xmlns:p14="http://schemas.microsoft.com/office/powerpoint/2010/main" val="1164356474"/>
+      </p:ext>
+    </p:extLst>
+  </p:cSld>
+  <p:clrMapOvr>
+    <a:masterClrMapping/>
+  </p:clrMapOvr>
+</p:sld>
+</file>
+
+<file path=ppt/slides/slide11.xml><?xml version="1.0" encoding="utf-8"?>
+<p:sld xmlns:a="http://schemas.openxmlformats.org/drawingml/2006/main" xmlns:r="http://schemas.openxmlformats.org/officeDocument/2006/relationships" xmlns:p="http://schemas.openxmlformats.org/presentationml/2006/main">
+  <p:cSld>
+    <p:spTree>
+      <p:nvGrpSpPr>
+        <p:cNvPr id="1" name=""/>
+        <p:cNvGrpSpPr/>
+        <p:nvPr/>
+      </p:nvGrpSpPr>
+      <p:grpSpPr>
+        <a:xfrm>
+          <a:off x="0" y="0"/>
+          <a:ext cx="0" cy="0"/>
+          <a:chOff x="0" y="0"/>
+          <a:chExt cx="0" cy="0"/>
+        </a:xfrm>
+      </p:grpSpPr>
+      <p:sp>
+        <p:nvSpPr>
+          <p:cNvPr id="2" name="Title 1">
+            <a:extLst>
+              <a:ext uri="{FF2B5EF4-FFF2-40B4-BE49-F238E27FC236}">
+                <a16:creationId xmlns:a16="http://schemas.microsoft.com/office/drawing/2014/main" id="{96CBC143-198D-4DE8-9EB7-CBCBB60EFD0E}"/>
+              </a:ext>
+            </a:extLst>
+          </p:cNvPr>
+          <p:cNvSpPr>
+            <a:spLocks noGrp="1"/>
+          </p:cNvSpPr>
+          <p:nvPr>
+            <p:ph type="title"/>
+          </p:nvPr>
+        </p:nvSpPr>
+        <p:spPr/>
+        <p:txBody>
+          <a:bodyPr>
+            <a:normAutofit/>
+          </a:bodyPr>
+          <a:lstStyle/>
+          <a:p>
+            <a:r>
+              <a:rPr lang="en-US" sz="3200" dirty="0"/>
+              <a:t>Future Improvements</a:t>
+            </a:r>
+          </a:p>
+        </p:txBody>
+      </p:sp>
+      <p:sp>
+        <p:nvSpPr>
+          <p:cNvPr id="3" name="Content Placeholder 2">
+            <a:extLst>
+              <a:ext uri="{FF2B5EF4-FFF2-40B4-BE49-F238E27FC236}">
+                <a16:creationId xmlns:a16="http://schemas.microsoft.com/office/drawing/2014/main" id="{BB7248DF-105D-476C-9E42-8B329D9B3605}"/>
+              </a:ext>
+            </a:extLst>
+          </p:cNvPr>
+          <p:cNvSpPr>
+            <a:spLocks noGrp="1"/>
+          </p:cNvSpPr>
+          <p:nvPr>
+            <p:ph idx="1"/>
+          </p:nvPr>
+        </p:nvSpPr>
+        <p:spPr/>
+        <p:txBody>
+          <a:bodyPr/>
+          <a:lstStyle/>
+          <a:p>
+            <a:r>
+              <a:rPr lang="en-US" dirty="0"/>
+              <a:t>Security mechanism to be applied.</a:t>
+            </a:r>
+          </a:p>
+          <a:p>
+            <a:r>
+              <a:rPr lang="en-US" dirty="0"/>
+              <a:t>Validation and exception scenarios.</a:t>
+            </a:r>
+          </a:p>
+          <a:p>
+            <a:r>
+              <a:rPr lang="en-US" dirty="0"/>
+              <a:t>Write Junit Test Cases.</a:t>
+            </a:r>
+          </a:p>
+        </p:txBody>
+      </p:sp>
+    </p:spTree>
+    <p:extLst>
+      <p:ext uri="{BB962C8B-B14F-4D97-AF65-F5344CB8AC3E}">
+        <p14:creationId xmlns:p14="http://schemas.microsoft.com/office/powerpoint/2010/main" val="443085990"/>
+      </p:ext>
+    </p:extLst>
+  </p:cSld>
+  <p:clrMapOvr>
+    <a:masterClrMapping/>
+  </p:clrMapOvr>
+</p:sld>
+</file>
+
 <file path=ppt/slides/slide2.xml><?xml version="1.0" encoding="utf-8"?>
 <p:sld xmlns:a="http://schemas.openxmlformats.org/drawingml/2006/main" xmlns:r="http://schemas.openxmlformats.org/officeDocument/2006/relationships" xmlns:p="http://schemas.openxmlformats.org/presentationml/2006/main">
   <p:cSld>
@@ -6327,10 +6524,10 @@
       </p:sp>
       <p:pic>
         <p:nvPicPr>
-          <p:cNvPr id="7" name="Content Placeholder 6">
+          <p:cNvPr id="6" name="Content Placeholder 5">
             <a:extLst>
               <a:ext uri="{FF2B5EF4-FFF2-40B4-BE49-F238E27FC236}">
-                <a16:creationId xmlns:a16="http://schemas.microsoft.com/office/drawing/2014/main" id="{7EDE95F3-6318-433F-B25C-D40EE65AB260}"/>
+                <a16:creationId xmlns:a16="http://schemas.microsoft.com/office/drawing/2014/main" id="{8C56995E-53E1-4099-85D0-ECA5A07960EC}"/>
               </a:ext>
             </a:extLst>
           </p:cNvPr>
@@ -6355,8 +6552,8 @@
         </p:blipFill>
         <p:spPr>
           <a:xfrm>
-            <a:off x="260878" y="1981200"/>
-            <a:ext cx="6697135" cy="3733800"/>
+            <a:off x="609600" y="2188032"/>
+            <a:ext cx="6348413" cy="3826549"/>
           </a:xfrm>
         </p:spPr>
       </p:pic>
@@ -6409,13 +6606,13 @@
         <p:spPr/>
         <p:txBody>
           <a:bodyPr>
-            <a:normAutofit fontScale="90000"/>
+            <a:normAutofit/>
           </a:bodyPr>
           <a:lstStyle/>
           <a:p>
             <a:r>
               <a:rPr lang="en-US" sz="3100" dirty="0"/>
-              <a:t>Swagger UI: airline-business-service</a:t>
+              <a:t>Swagger UI: auth-service</a:t>
             </a:r>
             <a:br>
               <a:rPr lang="en-US" dirty="0"/>
@@ -6451,10 +6648,10 @@
       </p:sp>
       <p:pic>
         <p:nvPicPr>
-          <p:cNvPr id="9" name="Picture 8">
+          <p:cNvPr id="3" name="Picture 2">
             <a:extLst>
               <a:ext uri="{FF2B5EF4-FFF2-40B4-BE49-F238E27FC236}">
-                <a16:creationId xmlns:a16="http://schemas.microsoft.com/office/drawing/2014/main" id="{6E46FFD9-363E-4C16-8E53-DE1DFF312CE7}"/>
+                <a16:creationId xmlns:a16="http://schemas.microsoft.com/office/drawing/2014/main" id="{D586C1A9-6DF2-47C1-A82D-50472ADC41DB}"/>
               </a:ext>
             </a:extLst>
           </p:cNvPr>
@@ -6471,8 +6668,8 @@
         </p:blipFill>
         <p:spPr>
           <a:xfrm>
-            <a:off x="304800" y="1905000"/>
-            <a:ext cx="6831624" cy="4267200"/>
+            <a:off x="152400" y="1600200"/>
+            <a:ext cx="7924800" cy="4495800"/>
           </a:xfrm>
           <a:prstGeom prst="rect">
             <a:avLst/>
@@ -6533,18 +6730,26 @@
           <a:lstStyle/>
           <a:p>
             <a:r>
-              <a:rPr lang="en-US" sz="2800" dirty="0"/>
-              <a:t>Swagger UI: airline-data-service</a:t>
-            </a:r>
-          </a:p>
-        </p:txBody>
-      </p:sp>
-      <p:sp>
-        <p:nvSpPr>
-          <p:cNvPr id="5" name="Content Placeholder 4">
+              <a:rPr lang="en-US" sz="3100" dirty="0" err="1"/>
+              <a:t>Hystrix</a:t>
+            </a:r>
+            <a:r>
+              <a:rPr lang="en-US" sz="3100" dirty="0"/>
+              <a:t> Stream</a:t>
+            </a:r>
+            <a:br>
+              <a:rPr lang="en-US" dirty="0"/>
+            </a:br>
+            <a:endParaRPr lang="en-US" dirty="0"/>
+          </a:p>
+        </p:txBody>
+      </p:sp>
+      <p:sp>
+        <p:nvSpPr>
+          <p:cNvPr id="6" name="Content Placeholder 5">
             <a:extLst>
               <a:ext uri="{FF2B5EF4-FFF2-40B4-BE49-F238E27FC236}">
-                <a16:creationId xmlns:a16="http://schemas.microsoft.com/office/drawing/2014/main" id="{B760CE4E-8C76-4002-8CDA-F14BE19EF06A}"/>
+                <a16:creationId xmlns:a16="http://schemas.microsoft.com/office/drawing/2014/main" id="{3C008217-F3CD-4390-8E1E-FE5F169C7273}"/>
               </a:ext>
             </a:extLst>
           </p:cNvPr>
@@ -6560,16 +6765,16 @@
           <a:bodyPr/>
           <a:lstStyle/>
           <a:p>
-            <a:endParaRPr lang="en-US"/>
+            <a:endParaRPr lang="en-US" dirty="0"/>
           </a:p>
         </p:txBody>
       </p:sp>
       <p:pic>
         <p:nvPicPr>
-          <p:cNvPr id="7" name="Picture 6">
+          <p:cNvPr id="4" name="Picture 3">
             <a:extLst>
               <a:ext uri="{FF2B5EF4-FFF2-40B4-BE49-F238E27FC236}">
-                <a16:creationId xmlns:a16="http://schemas.microsoft.com/office/drawing/2014/main" id="{CC81BA68-ABF2-469D-BC5C-26BCDE9046F8}"/>
+                <a16:creationId xmlns:a16="http://schemas.microsoft.com/office/drawing/2014/main" id="{273BED03-D763-4DC5-B738-5DB4D76BF5D3}"/>
               </a:ext>
             </a:extLst>
           </p:cNvPr>
@@ -6586,8 +6791,8 @@
         </p:blipFill>
         <p:spPr>
           <a:xfrm>
-            <a:off x="381001" y="1676400"/>
-            <a:ext cx="6629399" cy="4495800"/>
+            <a:off x="120380" y="1371600"/>
+            <a:ext cx="9023620" cy="4170437"/>
           </a:xfrm>
           <a:prstGeom prst="rect">
             <a:avLst/>
@@ -6597,7 +6802,7 @@
     </p:spTree>
     <p:extLst>
       <p:ext uri="{BB962C8B-B14F-4D97-AF65-F5344CB8AC3E}">
-        <p14:creationId xmlns:p14="http://schemas.microsoft.com/office/powerpoint/2010/main" val="2429790931"/>
+        <p14:creationId xmlns:p14="http://schemas.microsoft.com/office/powerpoint/2010/main" val="4030273035"/>
       </p:ext>
     </p:extLst>
   </p:cSld>
@@ -6608,6 +6813,125 @@
 </file>
 
 <file path=ppt/slides/slide6.xml><?xml version="1.0" encoding="utf-8"?>
+<p:sld xmlns:a="http://schemas.openxmlformats.org/drawingml/2006/main" xmlns:r="http://schemas.openxmlformats.org/officeDocument/2006/relationships" xmlns:p="http://schemas.openxmlformats.org/presentationml/2006/main">
+  <p:cSld>
+    <p:spTree>
+      <p:nvGrpSpPr>
+        <p:cNvPr id="1" name=""/>
+        <p:cNvGrpSpPr/>
+        <p:nvPr/>
+      </p:nvGrpSpPr>
+      <p:grpSpPr>
+        <a:xfrm>
+          <a:off x="0" y="0"/>
+          <a:ext cx="0" cy="0"/>
+          <a:chOff x="0" y="0"/>
+          <a:chExt cx="0" cy="0"/>
+        </a:xfrm>
+      </p:grpSpPr>
+      <p:sp>
+        <p:nvSpPr>
+          <p:cNvPr id="2" name="Title 1">
+            <a:extLst>
+              <a:ext uri="{FF2B5EF4-FFF2-40B4-BE49-F238E27FC236}">
+                <a16:creationId xmlns:a16="http://schemas.microsoft.com/office/drawing/2014/main" id="{3FA9F8E0-0EA8-4062-913E-C54A1D3FFCC8}"/>
+              </a:ext>
+            </a:extLst>
+          </p:cNvPr>
+          <p:cNvSpPr>
+            <a:spLocks noGrp="1"/>
+          </p:cNvSpPr>
+          <p:nvPr>
+            <p:ph type="title"/>
+          </p:nvPr>
+        </p:nvSpPr>
+        <p:spPr/>
+        <p:txBody>
+          <a:bodyPr>
+            <a:normAutofit/>
+          </a:bodyPr>
+          <a:lstStyle/>
+          <a:p>
+            <a:r>
+              <a:rPr lang="en-US" sz="3100" dirty="0"/>
+              <a:t>Swagger UI: auth-service</a:t>
+            </a:r>
+            <a:br>
+              <a:rPr lang="en-US" dirty="0"/>
+            </a:br>
+            <a:endParaRPr lang="en-US" dirty="0"/>
+          </a:p>
+        </p:txBody>
+      </p:sp>
+      <p:sp>
+        <p:nvSpPr>
+          <p:cNvPr id="6" name="Content Placeholder 5">
+            <a:extLst>
+              <a:ext uri="{FF2B5EF4-FFF2-40B4-BE49-F238E27FC236}">
+                <a16:creationId xmlns:a16="http://schemas.microsoft.com/office/drawing/2014/main" id="{3C008217-F3CD-4390-8E1E-FE5F169C7273}"/>
+              </a:ext>
+            </a:extLst>
+          </p:cNvPr>
+          <p:cNvSpPr>
+            <a:spLocks noGrp="1"/>
+          </p:cNvSpPr>
+          <p:nvPr>
+            <p:ph idx="1"/>
+          </p:nvPr>
+        </p:nvSpPr>
+        <p:spPr/>
+        <p:txBody>
+          <a:bodyPr/>
+          <a:lstStyle/>
+          <a:p>
+            <a:endParaRPr lang="en-US"/>
+          </a:p>
+        </p:txBody>
+      </p:sp>
+      <p:pic>
+        <p:nvPicPr>
+          <p:cNvPr id="3" name="Picture 2">
+            <a:extLst>
+              <a:ext uri="{FF2B5EF4-FFF2-40B4-BE49-F238E27FC236}">
+                <a16:creationId xmlns:a16="http://schemas.microsoft.com/office/drawing/2014/main" id="{D586C1A9-6DF2-47C1-A82D-50472ADC41DB}"/>
+              </a:ext>
+            </a:extLst>
+          </p:cNvPr>
+          <p:cNvPicPr>
+            <a:picLocks noChangeAspect="1"/>
+          </p:cNvPicPr>
+          <p:nvPr/>
+        </p:nvPicPr>
+        <p:blipFill>
+          <a:blip r:embed="rId2"/>
+          <a:stretch>
+            <a:fillRect/>
+          </a:stretch>
+        </p:blipFill>
+        <p:spPr>
+          <a:xfrm>
+            <a:off x="152400" y="1600200"/>
+            <a:ext cx="7924800" cy="4495800"/>
+          </a:xfrm>
+          <a:prstGeom prst="rect">
+            <a:avLst/>
+          </a:prstGeom>
+        </p:spPr>
+      </p:pic>
+    </p:spTree>
+    <p:extLst>
+      <p:ext uri="{BB962C8B-B14F-4D97-AF65-F5344CB8AC3E}">
+        <p14:creationId xmlns:p14="http://schemas.microsoft.com/office/powerpoint/2010/main" val="1767641094"/>
+      </p:ext>
+    </p:extLst>
+  </p:cSld>
+  <p:clrMapOvr>
+    <a:masterClrMapping/>
+  </p:clrMapOvr>
+</p:sld>
+</file>
+
+<file path=ppt/slides/slide7.xml><?xml version="1.0" encoding="utf-8"?>
 <p:sld xmlns:a="http://schemas.openxmlformats.org/drawingml/2006/main" xmlns:r="http://schemas.openxmlformats.org/officeDocument/2006/relationships" xmlns:p="http://schemas.openxmlformats.org/presentationml/2006/main">
   <p:cSld>
     <p:spTree>
@@ -6732,96 +7056,6 @@
 </p:sld>
 </file>
 
-<file path=ppt/slides/slide7.xml><?xml version="1.0" encoding="utf-8"?>
-<p:sld xmlns:a="http://schemas.openxmlformats.org/drawingml/2006/main" xmlns:r="http://schemas.openxmlformats.org/officeDocument/2006/relationships" xmlns:p="http://schemas.openxmlformats.org/presentationml/2006/main">
-  <p:cSld>
-    <p:spTree>
-      <p:nvGrpSpPr>
-        <p:cNvPr id="1" name=""/>
-        <p:cNvGrpSpPr/>
-        <p:nvPr/>
-      </p:nvGrpSpPr>
-      <p:grpSpPr>
-        <a:xfrm>
-          <a:off x="0" y="0"/>
-          <a:ext cx="0" cy="0"/>
-          <a:chOff x="0" y="0"/>
-          <a:chExt cx="0" cy="0"/>
-        </a:xfrm>
-      </p:grpSpPr>
-      <p:sp>
-        <p:nvSpPr>
-          <p:cNvPr id="2" name="Title 1">
-            <a:extLst>
-              <a:ext uri="{FF2B5EF4-FFF2-40B4-BE49-F238E27FC236}">
-                <a16:creationId xmlns:a16="http://schemas.microsoft.com/office/drawing/2014/main" id="{96CBC143-198D-4DE8-9EB7-CBCBB60EFD0E}"/>
-              </a:ext>
-            </a:extLst>
-          </p:cNvPr>
-          <p:cNvSpPr>
-            <a:spLocks noGrp="1"/>
-          </p:cNvSpPr>
-          <p:nvPr>
-            <p:ph type="title"/>
-          </p:nvPr>
-        </p:nvSpPr>
-        <p:spPr/>
-        <p:txBody>
-          <a:bodyPr>
-            <a:normAutofit/>
-          </a:bodyPr>
-          <a:lstStyle/>
-          <a:p>
-            <a:r>
-              <a:rPr lang="en-US" sz="3200" dirty="0"/>
-              <a:t>Test Case: Tested Using Postman</a:t>
-            </a:r>
-          </a:p>
-        </p:txBody>
-      </p:sp>
-      <p:pic>
-        <p:nvPicPr>
-          <p:cNvPr id="7" name="Picture 6">
-            <a:extLst>
-              <a:ext uri="{FF2B5EF4-FFF2-40B4-BE49-F238E27FC236}">
-                <a16:creationId xmlns:a16="http://schemas.microsoft.com/office/drawing/2014/main" id="{8ECBC538-871C-47A2-B004-EC31FA8A05B5}"/>
-              </a:ext>
-            </a:extLst>
-          </p:cNvPr>
-          <p:cNvPicPr>
-            <a:picLocks noChangeAspect="1"/>
-          </p:cNvPicPr>
-          <p:nvPr/>
-        </p:nvPicPr>
-        <p:blipFill>
-          <a:blip r:embed="rId2"/>
-          <a:stretch>
-            <a:fillRect/>
-          </a:stretch>
-        </p:blipFill>
-        <p:spPr>
-          <a:xfrm>
-            <a:off x="304801" y="1905000"/>
-            <a:ext cx="7010399" cy="3810000"/>
-          </a:xfrm>
-          <a:prstGeom prst="rect">
-            <a:avLst/>
-          </a:prstGeom>
-        </p:spPr>
-      </p:pic>
-    </p:spTree>
-    <p:extLst>
-      <p:ext uri="{BB962C8B-B14F-4D97-AF65-F5344CB8AC3E}">
-        <p14:creationId xmlns:p14="http://schemas.microsoft.com/office/powerpoint/2010/main" val="4015799358"/>
-      </p:ext>
-    </p:extLst>
-  </p:cSld>
-  <p:clrMapOvr>
-    <a:masterClrMapping/>
-  </p:clrMapOvr>
-</p:sld>
-</file>
-
 <file path=ppt/slides/slide8.xml><?xml version="1.0" encoding="utf-8"?>
 <p:sld xmlns:a="http://schemas.openxmlformats.org/drawingml/2006/main" xmlns:r="http://schemas.openxmlformats.org/officeDocument/2006/relationships" xmlns:p="http://schemas.openxmlformats.org/presentationml/2006/main">
   <p:cSld>
@@ -6864,17 +7098,17 @@
           <a:p>
             <a:r>
               <a:rPr lang="en-US" sz="3200" dirty="0"/>
-              <a:t>Test Case: Tested Using Postman</a:t>
+              <a:t>Test Case: Token Generation</a:t>
             </a:r>
           </a:p>
         </p:txBody>
       </p:sp>
       <p:pic>
         <p:nvPicPr>
-          <p:cNvPr id="8" name="Picture 7">
+          <p:cNvPr id="3" name="Picture 2">
             <a:extLst>
               <a:ext uri="{FF2B5EF4-FFF2-40B4-BE49-F238E27FC236}">
-                <a16:creationId xmlns:a16="http://schemas.microsoft.com/office/drawing/2014/main" id="{C94DE5E0-5C5A-4545-AB27-777449DF41E2}"/>
+                <a16:creationId xmlns:a16="http://schemas.microsoft.com/office/drawing/2014/main" id="{B9A76979-D90F-41A0-89EA-D3AB7520C06D}"/>
               </a:ext>
             </a:extLst>
           </p:cNvPr>
@@ -6891,8 +7125,8 @@
         </p:blipFill>
         <p:spPr>
           <a:xfrm>
-            <a:off x="381000" y="1600200"/>
-            <a:ext cx="6863595" cy="3886200"/>
+            <a:off x="152400" y="1676400"/>
+            <a:ext cx="7848600" cy="4267200"/>
           </a:xfrm>
           <a:prstGeom prst="rect">
             <a:avLst/>
@@ -6902,7 +7136,7 @@
     </p:spTree>
     <p:extLst>
       <p:ext uri="{BB962C8B-B14F-4D97-AF65-F5344CB8AC3E}">
-        <p14:creationId xmlns:p14="http://schemas.microsoft.com/office/powerpoint/2010/main" val="2971253590"/>
+        <p14:creationId xmlns:p14="http://schemas.microsoft.com/office/powerpoint/2010/main" val="4015799358"/>
       </p:ext>
     </p:extLst>
   </p:cSld>
@@ -6953,56 +7187,51 @@
           <a:lstStyle/>
           <a:p>
             <a:r>
-              <a:rPr lang="en-US" sz="3200" dirty="0"/>
-              <a:t>Future Improvements</a:t>
-            </a:r>
-          </a:p>
-        </p:txBody>
-      </p:sp>
-      <p:sp>
-        <p:nvSpPr>
-          <p:cNvPr id="3" name="Content Placeholder 2">
+              <a:rPr lang="en-US" sz="2800" dirty="0"/>
+              <a:t>Test Case: Added token </a:t>
+            </a:r>
+            <a:r>
+              <a:rPr lang="en-US" sz="2800"/>
+              <a:t>into header</a:t>
+            </a:r>
+            <a:endParaRPr lang="en-US" sz="2800" dirty="0"/>
+          </a:p>
+        </p:txBody>
+      </p:sp>
+      <p:pic>
+        <p:nvPicPr>
+          <p:cNvPr id="3" name="Picture 2">
             <a:extLst>
               <a:ext uri="{FF2B5EF4-FFF2-40B4-BE49-F238E27FC236}">
-                <a16:creationId xmlns:a16="http://schemas.microsoft.com/office/drawing/2014/main" id="{BB7248DF-105D-476C-9E42-8B329D9B3605}"/>
+                <a16:creationId xmlns:a16="http://schemas.microsoft.com/office/drawing/2014/main" id="{0169E236-099E-4791-B35F-4BA136D2FC75}"/>
               </a:ext>
             </a:extLst>
           </p:cNvPr>
-          <p:cNvSpPr>
-            <a:spLocks noGrp="1"/>
-          </p:cNvSpPr>
-          <p:nvPr>
-            <p:ph idx="1"/>
-          </p:nvPr>
-        </p:nvSpPr>
-        <p:spPr/>
-        <p:txBody>
-          <a:bodyPr/>
-          <a:lstStyle/>
-          <a:p>
-            <a:r>
-              <a:rPr lang="en-US" dirty="0"/>
-              <a:t>Security mechanism to be applied.</a:t>
-            </a:r>
-          </a:p>
-          <a:p>
-            <a:r>
-              <a:rPr lang="en-US" dirty="0"/>
-              <a:t>Validation and exception scenarios.</a:t>
-            </a:r>
-          </a:p>
-          <a:p>
-            <a:r>
-              <a:rPr lang="en-US" dirty="0"/>
-              <a:t>Write Junit Test Cases.</a:t>
-            </a:r>
-          </a:p>
-        </p:txBody>
-      </p:sp>
+          <p:cNvPicPr>
+            <a:picLocks noChangeAspect="1"/>
+          </p:cNvPicPr>
+          <p:nvPr/>
+        </p:nvPicPr>
+        <p:blipFill>
+          <a:blip r:embed="rId2"/>
+          <a:stretch>
+            <a:fillRect/>
+          </a:stretch>
+        </p:blipFill>
+        <p:spPr>
+          <a:xfrm>
+            <a:off x="0" y="1905000"/>
+            <a:ext cx="9144000" cy="2971800"/>
+          </a:xfrm>
+          <a:prstGeom prst="rect">
+            <a:avLst/>
+          </a:prstGeom>
+        </p:spPr>
+      </p:pic>
     </p:spTree>
     <p:extLst>
       <p:ext uri="{BB962C8B-B14F-4D97-AF65-F5344CB8AC3E}">
-        <p14:creationId xmlns:p14="http://schemas.microsoft.com/office/powerpoint/2010/main" val="443085990"/>
+        <p14:creationId xmlns:p14="http://schemas.microsoft.com/office/powerpoint/2010/main" val="2692805498"/>
       </p:ext>
     </p:extLst>
   </p:cSld>

</xml_diff>